<commit_message>
Updated to RECCO v1.3 managing training data
</commit_message>
<xml_diff>
--- a/docs/other/emptysheets_sampledata.pptx
+++ b/docs/other/emptysheets_sampledata.pptx
@@ -5,7 +5,7 @@
     <p:sldMasterId id="2147483648" r:id="rId1"/>
   </p:sldMasterIdLst>
   <p:sldIdLst>
-    <p:sldId id="257" r:id="rId2"/>
+    <p:sldId id="259" r:id="rId2"/>
   </p:sldIdLst>
   <p:sldSz cx="12192000" cy="6858000"/>
   <p:notesSz cx="6858000" cy="9144000"/>
@@ -259,7 +259,7 @@
           <a:p>
             <a:fld id="{9FB57E60-3D41-5746-B068-8E3627FFEE32}" type="datetimeFigureOut">
               <a:rPr lang="it-IT" smtClean="0"/>
-              <a:t>06/12/23</a:t>
+              <a:t>30/04/25</a:t>
             </a:fld>
             <a:endParaRPr lang="it-IT"/>
           </a:p>
@@ -457,7 +457,7 @@
           <a:p>
             <a:fld id="{9FB57E60-3D41-5746-B068-8E3627FFEE32}" type="datetimeFigureOut">
               <a:rPr lang="it-IT" smtClean="0"/>
-              <a:t>06/12/23</a:t>
+              <a:t>30/04/25</a:t>
             </a:fld>
             <a:endParaRPr lang="it-IT"/>
           </a:p>
@@ -665,7 +665,7 @@
           <a:p>
             <a:fld id="{9FB57E60-3D41-5746-B068-8E3627FFEE32}" type="datetimeFigureOut">
               <a:rPr lang="it-IT" smtClean="0"/>
-              <a:t>06/12/23</a:t>
+              <a:t>30/04/25</a:t>
             </a:fld>
             <a:endParaRPr lang="it-IT"/>
           </a:p>
@@ -863,7 +863,7 @@
           <a:p>
             <a:fld id="{9FB57E60-3D41-5746-B068-8E3627FFEE32}" type="datetimeFigureOut">
               <a:rPr lang="it-IT" smtClean="0"/>
-              <a:t>06/12/23</a:t>
+              <a:t>30/04/25</a:t>
             </a:fld>
             <a:endParaRPr lang="it-IT"/>
           </a:p>
@@ -1138,7 +1138,7 @@
           <a:p>
             <a:fld id="{9FB57E60-3D41-5746-B068-8E3627FFEE32}" type="datetimeFigureOut">
               <a:rPr lang="it-IT" smtClean="0"/>
-              <a:t>06/12/23</a:t>
+              <a:t>30/04/25</a:t>
             </a:fld>
             <a:endParaRPr lang="it-IT"/>
           </a:p>
@@ -1403,7 +1403,7 @@
           <a:p>
             <a:fld id="{9FB57E60-3D41-5746-B068-8E3627FFEE32}" type="datetimeFigureOut">
               <a:rPr lang="it-IT" smtClean="0"/>
-              <a:t>06/12/23</a:t>
+              <a:t>30/04/25</a:t>
             </a:fld>
             <a:endParaRPr lang="it-IT"/>
           </a:p>
@@ -1815,7 +1815,7 @@
           <a:p>
             <a:fld id="{9FB57E60-3D41-5746-B068-8E3627FFEE32}" type="datetimeFigureOut">
               <a:rPr lang="it-IT" smtClean="0"/>
-              <a:t>06/12/23</a:t>
+              <a:t>30/04/25</a:t>
             </a:fld>
             <a:endParaRPr lang="it-IT"/>
           </a:p>
@@ -1956,7 +1956,7 @@
           <a:p>
             <a:fld id="{9FB57E60-3D41-5746-B068-8E3627FFEE32}" type="datetimeFigureOut">
               <a:rPr lang="it-IT" smtClean="0"/>
-              <a:t>06/12/23</a:t>
+              <a:t>30/04/25</a:t>
             </a:fld>
             <a:endParaRPr lang="it-IT"/>
           </a:p>
@@ -2069,7 +2069,7 @@
           <a:p>
             <a:fld id="{9FB57E60-3D41-5746-B068-8E3627FFEE32}" type="datetimeFigureOut">
               <a:rPr lang="it-IT" smtClean="0"/>
-              <a:t>06/12/23</a:t>
+              <a:t>30/04/25</a:t>
             </a:fld>
             <a:endParaRPr lang="it-IT"/>
           </a:p>
@@ -2380,7 +2380,7 @@
           <a:p>
             <a:fld id="{9FB57E60-3D41-5746-B068-8E3627FFEE32}" type="datetimeFigureOut">
               <a:rPr lang="it-IT" smtClean="0"/>
-              <a:t>06/12/23</a:t>
+              <a:t>30/04/25</a:t>
             </a:fld>
             <a:endParaRPr lang="it-IT"/>
           </a:p>
@@ -2668,7 +2668,7 @@
           <a:p>
             <a:fld id="{9FB57E60-3D41-5746-B068-8E3627FFEE32}" type="datetimeFigureOut">
               <a:rPr lang="it-IT" smtClean="0"/>
-              <a:t>06/12/23</a:t>
+              <a:t>30/04/25</a:t>
             </a:fld>
             <a:endParaRPr lang="it-IT"/>
           </a:p>
@@ -2909,7 +2909,7 @@
           <a:p>
             <a:fld id="{9FB57E60-3D41-5746-B068-8E3627FFEE32}" type="datetimeFigureOut">
               <a:rPr lang="it-IT" smtClean="0"/>
-              <a:t>06/12/23</a:t>
+              <a:t>30/04/25</a:t>
             </a:fld>
             <a:endParaRPr lang="it-IT"/>
           </a:p>
@@ -3314,7 +3314,13 @@
   <p:cSld>
     <p:spTree>
       <p:nvGrpSpPr>
-        <p:cNvPr id="1" name=""/>
+        <p:cNvPr id="1" name="">
+          <a:extLst>
+            <a:ext uri="{FF2B5EF4-FFF2-40B4-BE49-F238E27FC236}">
+              <a16:creationId xmlns:a16="http://schemas.microsoft.com/office/drawing/2014/main" id="{007BC2F2-DF6F-9264-5B11-57D46A46CCA5}"/>
+            </a:ext>
+          </a:extLst>
+        </p:cNvPr>
         <p:cNvGrpSpPr/>
         <p:nvPr/>
       </p:nvGrpSpPr>
@@ -3328,10 +3334,10 @@
       </p:grpSpPr>
       <p:pic>
         <p:nvPicPr>
-          <p:cNvPr id="15" name="Immagine 14">
-            <a:extLst>
-              <a:ext uri="{FF2B5EF4-FFF2-40B4-BE49-F238E27FC236}">
-                <a16:creationId xmlns:a16="http://schemas.microsoft.com/office/drawing/2014/main" id="{DDDEB40B-72A9-C34E-FD2B-905E5C5E3761}"/>
+          <p:cNvPr id="4" name="Immagine 3" descr="Immagine che contiene testo, schermata, software, numero&#10;&#10;Il contenuto generato dall'IA potrebbe non essere corretto.">
+            <a:extLst>
+              <a:ext uri="{FF2B5EF4-FFF2-40B4-BE49-F238E27FC236}">
+                <a16:creationId xmlns:a16="http://schemas.microsoft.com/office/drawing/2014/main" id="{9FFEB276-1B14-4A72-CB39-8934B442F7FC}"/>
               </a:ext>
             </a:extLst>
           </p:cNvPr>
@@ -3342,13 +3348,14 @@
         </p:nvPicPr>
         <p:blipFill>
           <a:blip r:embed="rId2"/>
-          <a:srcRect/>
-          <a:stretch/>
+          <a:stretch>
+            <a:fillRect/>
+          </a:stretch>
         </p:blipFill>
         <p:spPr>
           <a:xfrm>
-            <a:off x="2204663" y="0"/>
-            <a:ext cx="7772399" cy="6848946"/>
+            <a:off x="2292621" y="345464"/>
+            <a:ext cx="7772400" cy="6184490"/>
           </a:xfrm>
           <a:prstGeom prst="rect">
             <a:avLst/>
@@ -3360,7 +3367,7 @@
           <p:cNvPr id="10" name="Rettangolo 9">
             <a:extLst>
               <a:ext uri="{FF2B5EF4-FFF2-40B4-BE49-F238E27FC236}">
-                <a16:creationId xmlns:a16="http://schemas.microsoft.com/office/drawing/2014/main" id="{7A4C78D6-3FB0-65B0-C3F7-AE4FF94D4624}"/>
+                <a16:creationId xmlns:a16="http://schemas.microsoft.com/office/drawing/2014/main" id="{64E915F3-758A-2D11-A94A-8FEF6FF324D6}"/>
               </a:ext>
             </a:extLst>
           </p:cNvPr>
@@ -3369,8 +3376,8 @@
         </p:nvSpPr>
         <p:spPr>
           <a:xfrm>
-            <a:off x="2694910" y="1455831"/>
-            <a:ext cx="5796000" cy="105104"/>
+            <a:off x="2694909" y="1460539"/>
+            <a:ext cx="6076731" cy="126348"/>
           </a:xfrm>
           <a:prstGeom prst="rect">
             <a:avLst/>
@@ -3412,7 +3419,7 @@
           <p:cNvPr id="11" name="Rettangolo 10">
             <a:extLst>
               <a:ext uri="{FF2B5EF4-FFF2-40B4-BE49-F238E27FC236}">
-                <a16:creationId xmlns:a16="http://schemas.microsoft.com/office/drawing/2014/main" id="{E8BBE40F-8EF6-80A3-96DC-E0AE2A08800D}"/>
+                <a16:creationId xmlns:a16="http://schemas.microsoft.com/office/drawing/2014/main" id="{DDAF80D5-F524-724B-7ACC-9D8381ACA920}"/>
               </a:ext>
             </a:extLst>
           </p:cNvPr>
@@ -3421,8 +3428,8 @@
         </p:nvSpPr>
         <p:spPr>
           <a:xfrm>
-            <a:off x="8561733" y="1455395"/>
-            <a:ext cx="792000" cy="105104"/>
+            <a:off x="8816016" y="1460561"/>
+            <a:ext cx="792000" cy="126348"/>
           </a:xfrm>
           <a:prstGeom prst="rect">
             <a:avLst/>
@@ -3464,7 +3471,7 @@
           <p:cNvPr id="12" name="Rettangolo 11">
             <a:extLst>
               <a:ext uri="{FF2B5EF4-FFF2-40B4-BE49-F238E27FC236}">
-                <a16:creationId xmlns:a16="http://schemas.microsoft.com/office/drawing/2014/main" id="{A0A65620-8111-7770-EFEB-4064DBC5DF9D}"/>
+                <a16:creationId xmlns:a16="http://schemas.microsoft.com/office/drawing/2014/main" id="{3BAC8372-F4A1-20B7-8EFC-32600FB1DBF5}"/>
               </a:ext>
             </a:extLst>
           </p:cNvPr>
@@ -3473,8 +3480,8 @@
         </p:nvSpPr>
         <p:spPr>
           <a:xfrm>
-            <a:off x="2694910" y="1676103"/>
-            <a:ext cx="2052000" cy="4148964"/>
+            <a:off x="2695314" y="1676103"/>
+            <a:ext cx="2417780" cy="4001886"/>
           </a:xfrm>
           <a:prstGeom prst="rect">
             <a:avLst/>
@@ -3516,7 +3523,7 @@
           <p:cNvPr id="13" name="Rettangolo 12">
             <a:extLst>
               <a:ext uri="{FF2B5EF4-FFF2-40B4-BE49-F238E27FC236}">
-                <a16:creationId xmlns:a16="http://schemas.microsoft.com/office/drawing/2014/main" id="{4EA3D372-5CA8-D4ED-EEB7-479E2E7B7FA1}"/>
+                <a16:creationId xmlns:a16="http://schemas.microsoft.com/office/drawing/2014/main" id="{36E0B284-D57C-F318-CA59-9D59580AA1D0}"/>
               </a:ext>
             </a:extLst>
           </p:cNvPr>
@@ -3525,8 +3532,8 @@
         </p:nvSpPr>
         <p:spPr>
           <a:xfrm>
-            <a:off x="4792133" y="1676103"/>
-            <a:ext cx="4165600" cy="4148964"/>
+            <a:off x="5113094" y="1676103"/>
+            <a:ext cx="4091731" cy="4001886"/>
           </a:xfrm>
           <a:prstGeom prst="rect">
             <a:avLst/>
@@ -3568,7 +3575,7 @@
           <p:cNvPr id="16" name="Connettore 2 15">
             <a:extLst>
               <a:ext uri="{FF2B5EF4-FFF2-40B4-BE49-F238E27FC236}">
-                <a16:creationId xmlns:a16="http://schemas.microsoft.com/office/drawing/2014/main" id="{9F44B692-53F8-3614-C69F-88E3F9B55AB2}"/>
+                <a16:creationId xmlns:a16="http://schemas.microsoft.com/office/drawing/2014/main" id="{92E5E2C8-6E18-B594-F5A9-561FC196E5D0}"/>
               </a:ext>
             </a:extLst>
           </p:cNvPr>
@@ -3609,7 +3616,7 @@
           <p:cNvPr id="17" name="CasellaDiTesto 16">
             <a:extLst>
               <a:ext uri="{FF2B5EF4-FFF2-40B4-BE49-F238E27FC236}">
-                <a16:creationId xmlns:a16="http://schemas.microsoft.com/office/drawing/2014/main" id="{8B196FCD-8E31-43A9-5E95-1E98927C8B17}"/>
+                <a16:creationId xmlns:a16="http://schemas.microsoft.com/office/drawing/2014/main" id="{599F8584-146D-F482-5286-11E0D2720863}"/>
               </a:ext>
             </a:extLst>
           </p:cNvPr>
@@ -3649,7 +3656,7 @@
           <p:cNvPr id="18" name="Connettore 2 17">
             <a:extLst>
               <a:ext uri="{FF2B5EF4-FFF2-40B4-BE49-F238E27FC236}">
-                <a16:creationId xmlns:a16="http://schemas.microsoft.com/office/drawing/2014/main" id="{B5058D98-15FE-1A9A-6ACD-8212CBE41362}"/>
+                <a16:creationId xmlns:a16="http://schemas.microsoft.com/office/drawing/2014/main" id="{194BC587-206E-4650-ED48-009ABDCB1424}"/>
               </a:ext>
             </a:extLst>
           </p:cNvPr>
@@ -3661,8 +3668,8 @@
         </p:nvCxnSpPr>
         <p:spPr>
           <a:xfrm flipH="1">
-            <a:off x="9389535" y="1370930"/>
-            <a:ext cx="522702" cy="126348"/>
+            <a:off x="9652392" y="1370930"/>
+            <a:ext cx="259845" cy="126348"/>
           </a:xfrm>
           <a:prstGeom prst="straightConnector1">
             <a:avLst/>
@@ -3691,7 +3698,7 @@
           <p:cNvPr id="19" name="CasellaDiTesto 18">
             <a:extLst>
               <a:ext uri="{FF2B5EF4-FFF2-40B4-BE49-F238E27FC236}">
-                <a16:creationId xmlns:a16="http://schemas.microsoft.com/office/drawing/2014/main" id="{DA48C06D-6A2D-075B-4F50-3F6EDF21A850}"/>
+                <a16:creationId xmlns:a16="http://schemas.microsoft.com/office/drawing/2014/main" id="{87BD0607-61E7-3F42-36D4-97417B72DB69}"/>
               </a:ext>
             </a:extLst>
           </p:cNvPr>
@@ -3742,7 +3749,7 @@
           <p:cNvPr id="21" name="CasellaDiTesto 20">
             <a:extLst>
               <a:ext uri="{FF2B5EF4-FFF2-40B4-BE49-F238E27FC236}">
-                <a16:creationId xmlns:a16="http://schemas.microsoft.com/office/drawing/2014/main" id="{C6711520-7892-29B3-F962-C2317A08C4C9}"/>
+                <a16:creationId xmlns:a16="http://schemas.microsoft.com/office/drawing/2014/main" id="{FF90F2C6-D380-68EA-29CC-91CDE54CCA2C}"/>
               </a:ext>
             </a:extLst>
           </p:cNvPr>
@@ -3815,7 +3822,7 @@
           <p:cNvPr id="22" name="Connettore 2 21">
             <a:extLst>
               <a:ext uri="{FF2B5EF4-FFF2-40B4-BE49-F238E27FC236}">
-                <a16:creationId xmlns:a16="http://schemas.microsoft.com/office/drawing/2014/main" id="{6D3BC533-C2F0-B918-1111-DDD23CCC5D06}"/>
+                <a16:creationId xmlns:a16="http://schemas.microsoft.com/office/drawing/2014/main" id="{A7AEC684-7796-349A-4A1F-F75E72042362}"/>
               </a:ext>
             </a:extLst>
           </p:cNvPr>
@@ -3857,7 +3864,7 @@
           <p:cNvPr id="24" name="Connettore 2 23">
             <a:extLst>
               <a:ext uri="{FF2B5EF4-FFF2-40B4-BE49-F238E27FC236}">
-                <a16:creationId xmlns:a16="http://schemas.microsoft.com/office/drawing/2014/main" id="{51F7FAF6-15F4-56A5-97E7-F2C0B8284097}"/>
+                <a16:creationId xmlns:a16="http://schemas.microsoft.com/office/drawing/2014/main" id="{B23CF3EF-7786-ED2F-871A-297C0F6A2E1E}"/>
               </a:ext>
             </a:extLst>
           </p:cNvPr>
@@ -3868,9 +3875,9 @@
           <p:nvPr/>
         </p:nvCxnSpPr>
         <p:spPr>
-          <a:xfrm>
-            <a:off x="1872901" y="2669546"/>
-            <a:ext cx="768100" cy="120220"/>
+          <a:xfrm flipV="1">
+            <a:off x="1872901" y="2337935"/>
+            <a:ext cx="787186" cy="331611"/>
           </a:xfrm>
           <a:prstGeom prst="straightConnector1">
             <a:avLst/>
@@ -3899,7 +3906,7 @@
           <p:cNvPr id="25" name="CasellaDiTesto 24">
             <a:extLst>
               <a:ext uri="{FF2B5EF4-FFF2-40B4-BE49-F238E27FC236}">
-                <a16:creationId xmlns:a16="http://schemas.microsoft.com/office/drawing/2014/main" id="{5610EFD9-9BFD-54A2-89C1-A8E9A389126B}"/>
+                <a16:creationId xmlns:a16="http://schemas.microsoft.com/office/drawing/2014/main" id="{52FC0A81-7EA2-6375-FC30-F18CA4EB214C}"/>
               </a:ext>
             </a:extLst>
           </p:cNvPr>
@@ -3975,7 +3982,7 @@
     </p:spTree>
     <p:extLst>
       <p:ext uri="{BB962C8B-B14F-4D97-AF65-F5344CB8AC3E}">
-        <p14:creationId xmlns:p14="http://schemas.microsoft.com/office/powerpoint/2010/main" val="4180472572"/>
+        <p14:creationId xmlns:p14="http://schemas.microsoft.com/office/powerpoint/2010/main" val="3135303770"/>
       </p:ext>
     </p:extLst>
   </p:cSld>

</xml_diff>